<commit_message>
Lightweight Python Pre Compiler and Packager (As a standalone app)
</commit_message>
<xml_diff>
--- a/Docs/Diagroms.pptx
+++ b/Docs/Diagroms.pptx
@@ -6,6 +6,9 @@
   </p:sldMasterIdLst>
   <p:sldIdLst>
     <p:sldId id="256" r:id="rId2"/>
+    <p:sldId id="257" r:id="rId3"/>
+    <p:sldId id="258" r:id="rId4"/>
+    <p:sldId id="259" r:id="rId5"/>
   </p:sldIdLst>
   <p:sldSz cx="12192000" cy="6858000"/>
   <p:notesSz cx="6858000" cy="9144000"/>
@@ -104,6 +107,11 @@
       </a:defRPr>
     </a:lvl9pPr>
   </p:defaultTextStyle>
+  <p:extLst>
+    <p:ext uri="{EFAFB233-063F-42B5-8137-9DF3F51BA10A}">
+      <p15:sldGuideLst xmlns:p15="http://schemas.microsoft.com/office/powerpoint/2012/main"/>
+    </p:ext>
+  </p:extLst>
 </p:presentation>
 </file>
 
@@ -238,7 +246,7 @@
           <a:p>
             <a:fld id="{8007FAF1-9C13-4905-84E4-2535DA1645F1}" type="datetimeFigureOut">
               <a:rPr lang="en-US" smtClean="0"/>
-              <a:t>11/4/2021</a:t>
+              <a:t>11/5/2021</a:t>
             </a:fld>
             <a:endParaRPr lang="en-US"/>
           </a:p>
@@ -408,7 +416,7 @@
           <a:p>
             <a:fld id="{8007FAF1-9C13-4905-84E4-2535DA1645F1}" type="datetimeFigureOut">
               <a:rPr lang="en-US" smtClean="0"/>
-              <a:t>11/4/2021</a:t>
+              <a:t>11/5/2021</a:t>
             </a:fld>
             <a:endParaRPr lang="en-US"/>
           </a:p>
@@ -588,7 +596,7 @@
           <a:p>
             <a:fld id="{8007FAF1-9C13-4905-84E4-2535DA1645F1}" type="datetimeFigureOut">
               <a:rPr lang="en-US" smtClean="0"/>
-              <a:t>11/4/2021</a:t>
+              <a:t>11/5/2021</a:t>
             </a:fld>
             <a:endParaRPr lang="en-US"/>
           </a:p>
@@ -758,7 +766,7 @@
           <a:p>
             <a:fld id="{8007FAF1-9C13-4905-84E4-2535DA1645F1}" type="datetimeFigureOut">
               <a:rPr lang="en-US" smtClean="0"/>
-              <a:t>11/4/2021</a:t>
+              <a:t>11/5/2021</a:t>
             </a:fld>
             <a:endParaRPr lang="en-US"/>
           </a:p>
@@ -1004,7 +1012,7 @@
           <a:p>
             <a:fld id="{8007FAF1-9C13-4905-84E4-2535DA1645F1}" type="datetimeFigureOut">
               <a:rPr lang="en-US" smtClean="0"/>
-              <a:t>11/4/2021</a:t>
+              <a:t>11/5/2021</a:t>
             </a:fld>
             <a:endParaRPr lang="en-US"/>
           </a:p>
@@ -1236,7 +1244,7 @@
           <a:p>
             <a:fld id="{8007FAF1-9C13-4905-84E4-2535DA1645F1}" type="datetimeFigureOut">
               <a:rPr lang="en-US" smtClean="0"/>
-              <a:t>11/4/2021</a:t>
+              <a:t>11/5/2021</a:t>
             </a:fld>
             <a:endParaRPr lang="en-US"/>
           </a:p>
@@ -1603,7 +1611,7 @@
           <a:p>
             <a:fld id="{8007FAF1-9C13-4905-84E4-2535DA1645F1}" type="datetimeFigureOut">
               <a:rPr lang="en-US" smtClean="0"/>
-              <a:t>11/4/2021</a:t>
+              <a:t>11/5/2021</a:t>
             </a:fld>
             <a:endParaRPr lang="en-US"/>
           </a:p>
@@ -1721,7 +1729,7 @@
           <a:p>
             <a:fld id="{8007FAF1-9C13-4905-84E4-2535DA1645F1}" type="datetimeFigureOut">
               <a:rPr lang="en-US" smtClean="0"/>
-              <a:t>11/4/2021</a:t>
+              <a:t>11/5/2021</a:t>
             </a:fld>
             <a:endParaRPr lang="en-US"/>
           </a:p>
@@ -1816,7 +1824,7 @@
           <a:p>
             <a:fld id="{8007FAF1-9C13-4905-84E4-2535DA1645F1}" type="datetimeFigureOut">
               <a:rPr lang="en-US" smtClean="0"/>
-              <a:t>11/4/2021</a:t>
+              <a:t>11/5/2021</a:t>
             </a:fld>
             <a:endParaRPr lang="en-US"/>
           </a:p>
@@ -2093,7 +2101,7 @@
           <a:p>
             <a:fld id="{8007FAF1-9C13-4905-84E4-2535DA1645F1}" type="datetimeFigureOut">
               <a:rPr lang="en-US" smtClean="0"/>
-              <a:t>11/4/2021</a:t>
+              <a:t>11/5/2021</a:t>
             </a:fld>
             <a:endParaRPr lang="en-US"/>
           </a:p>
@@ -2346,7 +2354,7 @@
           <a:p>
             <a:fld id="{8007FAF1-9C13-4905-84E4-2535DA1645F1}" type="datetimeFigureOut">
               <a:rPr lang="en-US" smtClean="0"/>
-              <a:t>11/4/2021</a:t>
+              <a:t>11/5/2021</a:t>
             </a:fld>
             <a:endParaRPr lang="en-US"/>
           </a:p>
@@ -2559,7 +2567,7 @@
           <a:p>
             <a:fld id="{8007FAF1-9C13-4905-84E4-2535DA1645F1}" type="datetimeFigureOut">
               <a:rPr lang="en-US" smtClean="0"/>
-              <a:t>11/4/2021</a:t>
+              <a:t>11/5/2021</a:t>
             </a:fld>
             <a:endParaRPr lang="en-US"/>
           </a:p>
@@ -3240,6 +3248,288 @@
 </p:sld>
 </file>
 
+<file path=ppt/slides/slide2.xml><?xml version="1.0" encoding="utf-8"?>
+<p:sld xmlns:a="http://schemas.openxmlformats.org/drawingml/2006/main" xmlns:r="http://schemas.openxmlformats.org/officeDocument/2006/relationships" xmlns:p="http://schemas.openxmlformats.org/presentationml/2006/main">
+  <p:cSld>
+    <p:spTree>
+      <p:nvGrpSpPr>
+        <p:cNvPr id="1" name=""/>
+        <p:cNvGrpSpPr/>
+        <p:nvPr/>
+      </p:nvGrpSpPr>
+      <p:grpSpPr>
+        <a:xfrm>
+          <a:off x="0" y="0"/>
+          <a:ext cx="0" cy="0"/>
+          <a:chOff x="0" y="0"/>
+          <a:chExt cx="0" cy="0"/>
+        </a:xfrm>
+      </p:grpSpPr>
+      <p:pic>
+        <p:nvPicPr>
+          <p:cNvPr id="4" name="Picture 3"/>
+          <p:cNvPicPr>
+            <a:picLocks noChangeAspect="1"/>
+          </p:cNvPicPr>
+          <p:nvPr/>
+        </p:nvPicPr>
+        <p:blipFill>
+          <a:blip r:embed="rId2"/>
+          <a:stretch>
+            <a:fillRect/>
+          </a:stretch>
+        </p:blipFill>
+        <p:spPr>
+          <a:xfrm>
+            <a:off x="213513" y="1974129"/>
+            <a:ext cx="2400635" cy="2667372"/>
+          </a:xfrm>
+          <a:prstGeom prst="rect">
+            <a:avLst/>
+          </a:prstGeom>
+          <a:effectLst>
+            <a:glow rad="152400">
+              <a:schemeClr val="accent6">
+                <a:lumMod val="60000"/>
+                <a:lumOff val="40000"/>
+              </a:schemeClr>
+            </a:glow>
+          </a:effectLst>
+        </p:spPr>
+      </p:pic>
+      <p:pic>
+        <p:nvPicPr>
+          <p:cNvPr id="5" name="Picture 4"/>
+          <p:cNvPicPr>
+            <a:picLocks noChangeAspect="1"/>
+          </p:cNvPicPr>
+          <p:nvPr/>
+        </p:nvPicPr>
+        <p:blipFill>
+          <a:blip r:embed="rId3"/>
+          <a:stretch>
+            <a:fillRect/>
+          </a:stretch>
+        </p:blipFill>
+        <p:spPr>
+          <a:xfrm>
+            <a:off x="3249147" y="1774033"/>
+            <a:ext cx="2762636" cy="1009791"/>
+          </a:xfrm>
+          <a:prstGeom prst="rect">
+            <a:avLst/>
+          </a:prstGeom>
+          <a:effectLst>
+            <a:glow rad="152400">
+              <a:schemeClr val="accent6">
+                <a:lumMod val="60000"/>
+                <a:lumOff val="40000"/>
+              </a:schemeClr>
+            </a:glow>
+          </a:effectLst>
+        </p:spPr>
+      </p:pic>
+      <p:pic>
+        <p:nvPicPr>
+          <p:cNvPr id="7" name="Picture 6"/>
+          <p:cNvPicPr>
+            <a:picLocks noChangeAspect="1"/>
+          </p:cNvPicPr>
+          <p:nvPr/>
+        </p:nvPicPr>
+        <p:blipFill>
+          <a:blip r:embed="rId4"/>
+          <a:stretch>
+            <a:fillRect/>
+          </a:stretch>
+        </p:blipFill>
+        <p:spPr>
+          <a:xfrm>
+            <a:off x="3282490" y="2974393"/>
+            <a:ext cx="2695951" cy="1667108"/>
+          </a:xfrm>
+          <a:prstGeom prst="rect">
+            <a:avLst/>
+          </a:prstGeom>
+          <a:effectLst>
+            <a:glow rad="152400">
+              <a:schemeClr val="accent6">
+                <a:lumMod val="60000"/>
+                <a:lumOff val="40000"/>
+              </a:schemeClr>
+            </a:glow>
+          </a:effectLst>
+        </p:spPr>
+      </p:pic>
+    </p:spTree>
+    <p:extLst>
+      <p:ext uri="{BB962C8B-B14F-4D97-AF65-F5344CB8AC3E}">
+        <p14:creationId xmlns:p14="http://schemas.microsoft.com/office/powerpoint/2010/main" val="1654249855"/>
+      </p:ext>
+    </p:extLst>
+  </p:cSld>
+  <p:clrMapOvr>
+    <a:masterClrMapping/>
+  </p:clrMapOvr>
+</p:sld>
+</file>
+
+<file path=ppt/slides/slide3.xml><?xml version="1.0" encoding="utf-8"?>
+<p:sld xmlns:a="http://schemas.openxmlformats.org/drawingml/2006/main" xmlns:r="http://schemas.openxmlformats.org/officeDocument/2006/relationships" xmlns:p="http://schemas.openxmlformats.org/presentationml/2006/main">
+  <p:cSld>
+    <p:spTree>
+      <p:nvGrpSpPr>
+        <p:cNvPr id="1" name=""/>
+        <p:cNvGrpSpPr/>
+        <p:nvPr/>
+      </p:nvGrpSpPr>
+      <p:grpSpPr>
+        <a:xfrm>
+          <a:off x="0" y="0"/>
+          <a:ext cx="0" cy="0"/>
+          <a:chOff x="0" y="0"/>
+          <a:chExt cx="0" cy="0"/>
+        </a:xfrm>
+      </p:grpSpPr>
+      <p:pic>
+        <p:nvPicPr>
+          <p:cNvPr id="4" name="Picture 3"/>
+          <p:cNvPicPr>
+            <a:picLocks noChangeAspect="1"/>
+          </p:cNvPicPr>
+          <p:nvPr/>
+        </p:nvPicPr>
+        <p:blipFill>
+          <a:blip r:embed="rId2"/>
+          <a:stretch>
+            <a:fillRect/>
+          </a:stretch>
+        </p:blipFill>
+        <p:spPr>
+          <a:xfrm>
+            <a:off x="304800" y="274198"/>
+            <a:ext cx="11645900" cy="3154802"/>
+          </a:xfrm>
+          <a:prstGeom prst="rect">
+            <a:avLst/>
+          </a:prstGeom>
+          <a:effectLst>
+            <a:glow rad="152400">
+              <a:schemeClr val="accent6">
+                <a:lumMod val="60000"/>
+                <a:lumOff val="40000"/>
+              </a:schemeClr>
+            </a:glow>
+          </a:effectLst>
+        </p:spPr>
+      </p:pic>
+      <p:pic>
+        <p:nvPicPr>
+          <p:cNvPr id="8" name="Picture 7"/>
+          <p:cNvPicPr>
+            <a:picLocks noChangeAspect="1"/>
+          </p:cNvPicPr>
+          <p:nvPr/>
+        </p:nvPicPr>
+        <p:blipFill>
+          <a:blip r:embed="rId3"/>
+          <a:stretch>
+            <a:fillRect/>
+          </a:stretch>
+        </p:blipFill>
+        <p:spPr>
+          <a:xfrm>
+            <a:off x="304800" y="4379846"/>
+            <a:ext cx="11463856" cy="1297054"/>
+          </a:xfrm>
+          <a:prstGeom prst="rect">
+            <a:avLst/>
+          </a:prstGeom>
+          <a:effectLst>
+            <a:glow rad="152400">
+              <a:schemeClr val="accent6">
+                <a:lumMod val="60000"/>
+                <a:lumOff val="40000"/>
+              </a:schemeClr>
+            </a:glow>
+          </a:effectLst>
+        </p:spPr>
+      </p:pic>
+    </p:spTree>
+    <p:extLst>
+      <p:ext uri="{BB962C8B-B14F-4D97-AF65-F5344CB8AC3E}">
+        <p14:creationId xmlns:p14="http://schemas.microsoft.com/office/powerpoint/2010/main" val="1075144252"/>
+      </p:ext>
+    </p:extLst>
+  </p:cSld>
+  <p:clrMapOvr>
+    <a:masterClrMapping/>
+  </p:clrMapOvr>
+</p:sld>
+</file>
+
+<file path=ppt/slides/slide4.xml><?xml version="1.0" encoding="utf-8"?>
+<p:sld xmlns:a="http://schemas.openxmlformats.org/drawingml/2006/main" xmlns:r="http://schemas.openxmlformats.org/officeDocument/2006/relationships" xmlns:p="http://schemas.openxmlformats.org/presentationml/2006/main">
+  <p:cSld>
+    <p:spTree>
+      <p:nvGrpSpPr>
+        <p:cNvPr id="1" name=""/>
+        <p:cNvGrpSpPr/>
+        <p:nvPr/>
+      </p:nvGrpSpPr>
+      <p:grpSpPr>
+        <a:xfrm>
+          <a:off x="0" y="0"/>
+          <a:ext cx="0" cy="0"/>
+          <a:chOff x="0" y="0"/>
+          <a:chExt cx="0" cy="0"/>
+        </a:xfrm>
+      </p:grpSpPr>
+      <p:pic>
+        <p:nvPicPr>
+          <p:cNvPr id="6" name="Picture 5"/>
+          <p:cNvPicPr>
+            <a:picLocks noChangeAspect="1"/>
+          </p:cNvPicPr>
+          <p:nvPr/>
+        </p:nvPicPr>
+        <p:blipFill>
+          <a:blip r:embed="rId2"/>
+          <a:stretch>
+            <a:fillRect/>
+          </a:stretch>
+        </p:blipFill>
+        <p:spPr>
+          <a:xfrm>
+            <a:off x="1144414" y="596900"/>
+            <a:ext cx="7203100" cy="2870200"/>
+          </a:xfrm>
+          <a:prstGeom prst="rect">
+            <a:avLst/>
+          </a:prstGeom>
+          <a:effectLst>
+            <a:glow rad="152400">
+              <a:schemeClr val="accent6">
+                <a:lumMod val="60000"/>
+                <a:lumOff val="40000"/>
+              </a:schemeClr>
+            </a:glow>
+          </a:effectLst>
+        </p:spPr>
+      </p:pic>
+    </p:spTree>
+    <p:extLst>
+      <p:ext uri="{BB962C8B-B14F-4D97-AF65-F5344CB8AC3E}">
+        <p14:creationId xmlns:p14="http://schemas.microsoft.com/office/powerpoint/2010/main" val="1042352092"/>
+      </p:ext>
+    </p:extLst>
+  </p:cSld>
+  <p:clrMapOvr>
+    <a:masterClrMapping/>
+  </p:clrMapOvr>
+</p:sld>
+</file>
+
 <file path=ppt/theme/theme1.xml><?xml version="1.0" encoding="utf-8"?>
 <a:theme xmlns:a="http://schemas.openxmlformats.org/drawingml/2006/main" name="Office Theme">
   <a:themeElements>

</xml_diff>

<commit_message>
Added support for both Internal and External Resources
</commit_message>
<xml_diff>
--- a/Docs/Diagroms.pptx
+++ b/Docs/Diagroms.pptx
@@ -202,7 +202,7 @@
           <a:p>
             <a:fld id="{5A2C9B09-DC4B-436A-A320-EFC262C85657}" type="datetimeFigureOut">
               <a:rPr lang="en-US" smtClean="0"/>
-              <a:t>11/5/2021</a:t>
+              <a:t>11/8/2021</a:t>
             </a:fld>
             <a:endParaRPr lang="en-US"/>
           </a:p>
@@ -685,7 +685,7 @@
           <a:p>
             <a:fld id="{8007FAF1-9C13-4905-84E4-2535DA1645F1}" type="datetimeFigureOut">
               <a:rPr lang="en-US" smtClean="0"/>
-              <a:t>11/5/2021</a:t>
+              <a:t>11/8/2021</a:t>
             </a:fld>
             <a:endParaRPr lang="en-US"/>
           </a:p>
@@ -855,7 +855,7 @@
           <a:p>
             <a:fld id="{8007FAF1-9C13-4905-84E4-2535DA1645F1}" type="datetimeFigureOut">
               <a:rPr lang="en-US" smtClean="0"/>
-              <a:t>11/5/2021</a:t>
+              <a:t>11/8/2021</a:t>
             </a:fld>
             <a:endParaRPr lang="en-US"/>
           </a:p>
@@ -1035,7 +1035,7 @@
           <a:p>
             <a:fld id="{8007FAF1-9C13-4905-84E4-2535DA1645F1}" type="datetimeFigureOut">
               <a:rPr lang="en-US" smtClean="0"/>
-              <a:t>11/5/2021</a:t>
+              <a:t>11/8/2021</a:t>
             </a:fld>
             <a:endParaRPr lang="en-US"/>
           </a:p>
@@ -1205,7 +1205,7 @@
           <a:p>
             <a:fld id="{8007FAF1-9C13-4905-84E4-2535DA1645F1}" type="datetimeFigureOut">
               <a:rPr lang="en-US" smtClean="0"/>
-              <a:t>11/5/2021</a:t>
+              <a:t>11/8/2021</a:t>
             </a:fld>
             <a:endParaRPr lang="en-US"/>
           </a:p>
@@ -1451,7 +1451,7 @@
           <a:p>
             <a:fld id="{8007FAF1-9C13-4905-84E4-2535DA1645F1}" type="datetimeFigureOut">
               <a:rPr lang="en-US" smtClean="0"/>
-              <a:t>11/5/2021</a:t>
+              <a:t>11/8/2021</a:t>
             </a:fld>
             <a:endParaRPr lang="en-US"/>
           </a:p>
@@ -1683,7 +1683,7 @@
           <a:p>
             <a:fld id="{8007FAF1-9C13-4905-84E4-2535DA1645F1}" type="datetimeFigureOut">
               <a:rPr lang="en-US" smtClean="0"/>
-              <a:t>11/5/2021</a:t>
+              <a:t>11/8/2021</a:t>
             </a:fld>
             <a:endParaRPr lang="en-US"/>
           </a:p>
@@ -2050,7 +2050,7 @@
           <a:p>
             <a:fld id="{8007FAF1-9C13-4905-84E4-2535DA1645F1}" type="datetimeFigureOut">
               <a:rPr lang="en-US" smtClean="0"/>
-              <a:t>11/5/2021</a:t>
+              <a:t>11/8/2021</a:t>
             </a:fld>
             <a:endParaRPr lang="en-US"/>
           </a:p>
@@ -2168,7 +2168,7 @@
           <a:p>
             <a:fld id="{8007FAF1-9C13-4905-84E4-2535DA1645F1}" type="datetimeFigureOut">
               <a:rPr lang="en-US" smtClean="0"/>
-              <a:t>11/5/2021</a:t>
+              <a:t>11/8/2021</a:t>
             </a:fld>
             <a:endParaRPr lang="en-US"/>
           </a:p>
@@ -2263,7 +2263,7 @@
           <a:p>
             <a:fld id="{8007FAF1-9C13-4905-84E4-2535DA1645F1}" type="datetimeFigureOut">
               <a:rPr lang="en-US" smtClean="0"/>
-              <a:t>11/5/2021</a:t>
+              <a:t>11/8/2021</a:t>
             </a:fld>
             <a:endParaRPr lang="en-US"/>
           </a:p>
@@ -2540,7 +2540,7 @@
           <a:p>
             <a:fld id="{8007FAF1-9C13-4905-84E4-2535DA1645F1}" type="datetimeFigureOut">
               <a:rPr lang="en-US" smtClean="0"/>
-              <a:t>11/5/2021</a:t>
+              <a:t>11/8/2021</a:t>
             </a:fld>
             <a:endParaRPr lang="en-US"/>
           </a:p>
@@ -2793,7 +2793,7 @@
           <a:p>
             <a:fld id="{8007FAF1-9C13-4905-84E4-2535DA1645F1}" type="datetimeFigureOut">
               <a:rPr lang="en-US" smtClean="0"/>
-              <a:t>11/5/2021</a:t>
+              <a:t>11/8/2021</a:t>
             </a:fld>
             <a:endParaRPr lang="en-US"/>
           </a:p>
@@ -3006,7 +3006,7 @@
           <a:p>
             <a:fld id="{8007FAF1-9C13-4905-84E4-2535DA1645F1}" type="datetimeFigureOut">
               <a:rPr lang="en-US" smtClean="0"/>
-              <a:t>11/5/2021</a:t>
+              <a:t>11/8/2021</a:t>
             </a:fld>
             <a:endParaRPr lang="en-US"/>
           </a:p>
@@ -3706,7 +3706,7 @@
       </p:grpSpPr>
       <p:pic>
         <p:nvPicPr>
-          <p:cNvPr id="4" name="Picture 3"/>
+          <p:cNvPr id="7" name="Picture 6"/>
           <p:cNvPicPr>
             <a:picLocks noChangeAspect="1"/>
           </p:cNvPicPr>
@@ -3720,8 +3720,8 @@
         </p:blipFill>
         <p:spPr>
           <a:xfrm>
-            <a:off x="213513" y="1974129"/>
-            <a:ext cx="2400635" cy="2667372"/>
+            <a:off x="3282490" y="2974393"/>
+            <a:ext cx="2695951" cy="1667108"/>
           </a:xfrm>
           <a:prstGeom prst="rect">
             <a:avLst/>
@@ -3738,7 +3738,7 @@
       </p:pic>
       <p:pic>
         <p:nvPicPr>
-          <p:cNvPr id="5" name="Picture 4"/>
+          <p:cNvPr id="2" name="Picture 1"/>
           <p:cNvPicPr>
             <a:picLocks noChangeAspect="1"/>
           </p:cNvPicPr>
@@ -3752,8 +3752,8 @@
         </p:blipFill>
         <p:spPr>
           <a:xfrm>
-            <a:off x="3249147" y="1774033"/>
-            <a:ext cx="2762636" cy="1009791"/>
+            <a:off x="228711" y="1774033"/>
+            <a:ext cx="2656920" cy="2867468"/>
           </a:xfrm>
           <a:prstGeom prst="rect">
             <a:avLst/>
@@ -3770,7 +3770,7 @@
       </p:pic>
       <p:pic>
         <p:nvPicPr>
-          <p:cNvPr id="7" name="Picture 6"/>
+          <p:cNvPr id="6" name="Picture 5"/>
           <p:cNvPicPr>
             <a:picLocks noChangeAspect="1"/>
           </p:cNvPicPr>
@@ -3784,8 +3784,8 @@
         </p:blipFill>
         <p:spPr>
           <a:xfrm>
-            <a:off x="3282490" y="2974393"/>
-            <a:ext cx="2695951" cy="1667108"/>
+            <a:off x="3282490" y="1774033"/>
+            <a:ext cx="3390900" cy="1076325"/>
           </a:xfrm>
           <a:prstGeom prst="rect">
             <a:avLst/>
@@ -4114,7 +4114,7 @@
       </p:grpSpPr>
       <p:pic>
         <p:nvPicPr>
-          <p:cNvPr id="3" name="Picture 2"/>
+          <p:cNvPr id="2" name="Picture 1"/>
           <p:cNvPicPr>
             <a:picLocks noChangeAspect="1"/>
           </p:cNvPicPr>
@@ -4129,7 +4129,7 @@
         <p:spPr>
           <a:xfrm>
             <a:off x="180468" y="136148"/>
-            <a:ext cx="11020932" cy="6620252"/>
+            <a:ext cx="12355318" cy="6349712"/>
           </a:xfrm>
           <a:prstGeom prst="rect">
             <a:avLst/>
@@ -4152,7 +4152,7 @@
         </p:nvSpPr>
         <p:spPr>
           <a:xfrm>
-            <a:off x="7162800" y="469900"/>
+            <a:off x="4991100" y="471351"/>
             <a:ext cx="5994400" cy="584775"/>
           </a:xfrm>
           <a:prstGeom prst="rect">
@@ -4200,7 +4200,7 @@
         </p:nvSpPr>
         <p:spPr>
           <a:xfrm>
-            <a:off x="8369300" y="1477327"/>
+            <a:off x="7295412" y="1511148"/>
             <a:ext cx="5994400" cy="338554"/>
           </a:xfrm>
           <a:prstGeom prst="rect">
@@ -4220,7 +4220,15 @@
                   <a:srgbClr val="0000FF"/>
                 </a:solidFill>
               </a:rPr>
-              <a:t>Entry Point. i.e Main() in Main.py</a:t>
+              <a:t>Entry Point. i.e Main() in </a:t>
+            </a:r>
+            <a:r>
+              <a:rPr lang="en-US" sz="1600" smtClean="0">
+                <a:solidFill>
+                  <a:srgbClr val="0000FF"/>
+                </a:solidFill>
+              </a:rPr>
+              <a:t>Main.py (Package DemoStandAloneApp)</a:t>
             </a:r>
             <a:endParaRPr lang="en-US" sz="1600">
               <a:solidFill>
@@ -4238,7 +4246,7 @@
         </p:nvSpPr>
         <p:spPr>
           <a:xfrm>
-            <a:off x="6362700" y="3036857"/>
+            <a:off x="6005771" y="3386816"/>
             <a:ext cx="3251200" cy="338554"/>
           </a:xfrm>
           <a:prstGeom prst="rect">
@@ -4276,7 +4284,7 @@
         </p:nvSpPr>
         <p:spPr>
           <a:xfrm>
-            <a:off x="2146300" y="2565350"/>
+            <a:off x="8184412" y="2659763"/>
             <a:ext cx="4216400" cy="338554"/>
           </a:xfrm>
           <a:prstGeom prst="rect">
@@ -4314,7 +4322,7 @@
         </p:nvSpPr>
         <p:spPr>
           <a:xfrm>
-            <a:off x="8528050" y="3633038"/>
+            <a:off x="6941289" y="4664901"/>
             <a:ext cx="2781300" cy="584775"/>
           </a:xfrm>
           <a:prstGeom prst="rect">
@@ -4367,7 +4375,7 @@
         </p:nvSpPr>
         <p:spPr>
           <a:xfrm>
-            <a:off x="5588000" y="4185472"/>
+            <a:off x="4492846" y="5473430"/>
             <a:ext cx="5397500" cy="830997"/>
           </a:xfrm>
           <a:prstGeom prst="rect">
@@ -4397,7 +4405,15 @@
                   <a:srgbClr val="0000FF"/>
                 </a:solidFill>
               </a:rPr>
-              <a:t>Will retain the temporary OBJ folder</a:t>
+              <a:t>NO, Will </a:t>
+            </a:r>
+            <a:r>
+              <a:rPr lang="en-US" sz="1600" smtClean="0">
+                <a:solidFill>
+                  <a:srgbClr val="0000FF"/>
+                </a:solidFill>
+              </a:rPr>
+              <a:t>retain the temporary OBJ folder</a:t>
             </a:r>
           </a:p>
           <a:p>
@@ -4425,7 +4441,7 @@
         </p:nvSpPr>
         <p:spPr>
           <a:xfrm>
-            <a:off x="8578850" y="2140722"/>
+            <a:off x="6005771" y="2179517"/>
             <a:ext cx="5994400" cy="338554"/>
           </a:xfrm>
           <a:prstGeom prst="rect">
@@ -4446,6 +4462,64 @@
                 </a:solidFill>
               </a:rPr>
               <a:t>Copy ‘RunApp.sh’ to BLD_DIR</a:t>
+            </a:r>
+            <a:endParaRPr lang="en-US" sz="1600">
+              <a:solidFill>
+                <a:srgbClr val="0000FF"/>
+              </a:solidFill>
+            </a:endParaRPr>
+          </a:p>
+        </p:txBody>
+      </p:sp>
+      <p:sp>
+        <p:nvSpPr>
+          <p:cNvPr id="13" name="TextBox 12"/>
+          <p:cNvSpPr txBox="1"/>
+          <p:nvPr/>
+        </p:nvSpPr>
+        <p:spPr>
+          <a:xfrm>
+            <a:off x="10131499" y="3272051"/>
+            <a:ext cx="2781300" cy="830997"/>
+          </a:xfrm>
+          <a:prstGeom prst="rect">
+            <a:avLst/>
+          </a:prstGeom>
+          <a:noFill/>
+        </p:spPr>
+        <p:txBody>
+          <a:bodyPr wrap="square" rtlCol="0">
+            <a:spAutoFit/>
+          </a:bodyPr>
+          <a:lstStyle/>
+          <a:p>
+            <a:r>
+              <a:rPr lang="en-US" sz="1600" smtClean="0">
+                <a:solidFill>
+                  <a:srgbClr val="0000FF"/>
+                </a:solidFill>
+              </a:rPr>
+              <a:t>These are internal resources</a:t>
+            </a:r>
+          </a:p>
+          <a:p>
+            <a:r>
+              <a:rPr lang="en-US" sz="1600" smtClean="0">
+                <a:solidFill>
+                  <a:srgbClr val="0000FF"/>
+                </a:solidFill>
+              </a:rPr>
+              <a:t>Kept only inside the Program</a:t>
+            </a:r>
+          </a:p>
+          <a:p>
+            <a:r>
+              <a:rPr lang="en-US" sz="1600" smtClean="0">
+                <a:solidFill>
+                  <a:srgbClr val="0000FF"/>
+                </a:solidFill>
+              </a:rPr>
+              <a:t>PYZ Archive file</a:t>
             </a:r>
             <a:endParaRPr lang="en-US" sz="1600">
               <a:solidFill>

</xml_diff>